<commit_message>
Include binomial function for grinding
</commit_message>
<xml_diff>
--- a/Schematics.pptx
+++ b/Schematics.pptx
@@ -5,7 +5,7 @@
     <p:sldMasterId id="2147483648" r:id="rId1"/>
   </p:sldMasterIdLst>
   <p:notesMasterIdLst>
-    <p:notesMasterId r:id="rId38"/>
+    <p:notesMasterId r:id="rId37"/>
   </p:notesMasterIdLst>
   <p:sldIdLst>
     <p:sldId id="256" r:id="rId2"/>
@@ -43,7 +43,6 @@
     <p:sldId id="293" r:id="rId34"/>
     <p:sldId id="294" r:id="rId35"/>
     <p:sldId id="295" r:id="rId36"/>
-    <p:sldId id="296" r:id="rId37"/>
   </p:sldIdLst>
   <p:sldSz cx="9144000" cy="6858000" type="screen4x3"/>
   <p:notesSz cx="6858000" cy="9144000"/>
@@ -227,7 +226,7 @@
           <a:p>
             <a:fld id="{9C623587-ED78-7A4F-A0A9-8C100C245B15}" type="datetimeFigureOut">
               <a:rPr lang="en-US" smtClean="0"/>
-              <a:t>2/16/15</a:t>
+              <a:t>2/26/15</a:t>
             </a:fld>
             <a:endParaRPr lang="en-US"/>
           </a:p>
@@ -1772,7 +1771,7 @@
           <a:p>
             <a:fld id="{756CED51-C4CA-3343-98C9-94E03FC0165E}" type="datetimeFigureOut">
               <a:rPr lang="en-US" smtClean="0"/>
-              <a:t>2/16/15</a:t>
+              <a:t>2/26/15</a:t>
             </a:fld>
             <a:endParaRPr lang="en-US"/>
           </a:p>
@@ -1942,7 +1941,7 @@
           <a:p>
             <a:fld id="{756CED51-C4CA-3343-98C9-94E03FC0165E}" type="datetimeFigureOut">
               <a:rPr lang="en-US" smtClean="0"/>
-              <a:t>2/16/15</a:t>
+              <a:t>2/26/15</a:t>
             </a:fld>
             <a:endParaRPr lang="en-US"/>
           </a:p>
@@ -2122,7 +2121,7 @@
           <a:p>
             <a:fld id="{756CED51-C4CA-3343-98C9-94E03FC0165E}" type="datetimeFigureOut">
               <a:rPr lang="en-US" smtClean="0"/>
-              <a:t>2/16/15</a:t>
+              <a:t>2/26/15</a:t>
             </a:fld>
             <a:endParaRPr lang="en-US"/>
           </a:p>
@@ -2292,7 +2291,7 @@
           <a:p>
             <a:fld id="{756CED51-C4CA-3343-98C9-94E03FC0165E}" type="datetimeFigureOut">
               <a:rPr lang="en-US" smtClean="0"/>
-              <a:t>2/16/15</a:t>
+              <a:t>2/26/15</a:t>
             </a:fld>
             <a:endParaRPr lang="en-US"/>
           </a:p>
@@ -2538,7 +2537,7 @@
           <a:p>
             <a:fld id="{756CED51-C4CA-3343-98C9-94E03FC0165E}" type="datetimeFigureOut">
               <a:rPr lang="en-US" smtClean="0"/>
-              <a:t>2/16/15</a:t>
+              <a:t>2/26/15</a:t>
             </a:fld>
             <a:endParaRPr lang="en-US"/>
           </a:p>
@@ -2826,7 +2825,7 @@
           <a:p>
             <a:fld id="{756CED51-C4CA-3343-98C9-94E03FC0165E}" type="datetimeFigureOut">
               <a:rPr lang="en-US" smtClean="0"/>
-              <a:t>2/16/15</a:t>
+              <a:t>2/26/15</a:t>
             </a:fld>
             <a:endParaRPr lang="en-US"/>
           </a:p>
@@ -3248,7 +3247,7 @@
           <a:p>
             <a:fld id="{756CED51-C4CA-3343-98C9-94E03FC0165E}" type="datetimeFigureOut">
               <a:rPr lang="en-US" smtClean="0"/>
-              <a:t>2/16/15</a:t>
+              <a:t>2/26/15</a:t>
             </a:fld>
             <a:endParaRPr lang="en-US"/>
           </a:p>
@@ -3366,7 +3365,7 @@
           <a:p>
             <a:fld id="{756CED51-C4CA-3343-98C9-94E03FC0165E}" type="datetimeFigureOut">
               <a:rPr lang="en-US" smtClean="0"/>
-              <a:t>2/16/15</a:t>
+              <a:t>2/26/15</a:t>
             </a:fld>
             <a:endParaRPr lang="en-US"/>
           </a:p>
@@ -3461,7 +3460,7 @@
           <a:p>
             <a:fld id="{756CED51-C4CA-3343-98C9-94E03FC0165E}" type="datetimeFigureOut">
               <a:rPr lang="en-US" smtClean="0"/>
-              <a:t>2/16/15</a:t>
+              <a:t>2/26/15</a:t>
             </a:fld>
             <a:endParaRPr lang="en-US"/>
           </a:p>
@@ -3738,7 +3737,7 @@
           <a:p>
             <a:fld id="{756CED51-C4CA-3343-98C9-94E03FC0165E}" type="datetimeFigureOut">
               <a:rPr lang="en-US" smtClean="0"/>
-              <a:t>2/16/15</a:t>
+              <a:t>2/26/15</a:t>
             </a:fld>
             <a:endParaRPr lang="en-US"/>
           </a:p>
@@ -3991,7 +3990,7 @@
           <a:p>
             <a:fld id="{756CED51-C4CA-3343-98C9-94E03FC0165E}" type="datetimeFigureOut">
               <a:rPr lang="en-US" smtClean="0"/>
-              <a:t>2/16/15</a:t>
+              <a:t>2/26/15</a:t>
             </a:fld>
             <a:endParaRPr lang="en-US"/>
           </a:p>
@@ -4204,7 +4203,7 @@
           <a:p>
             <a:fld id="{756CED51-C4CA-3343-98C9-94E03FC0165E}" type="datetimeFigureOut">
               <a:rPr lang="en-US" smtClean="0"/>
-              <a:t>2/16/15</a:t>
+              <a:t>2/26/15</a:t>
             </a:fld>
             <a:endParaRPr lang="en-US"/>
           </a:p>
@@ -6304,7 +6303,7 @@
           <a:graphicData uri="http://schemas.openxmlformats.org/presentationml/2006/ole">
             <mc:AlternateContent xmlns:mc="http://schemas.openxmlformats.org/markup-compatibility/2006">
               <mc:Choice xmlns:v="urn:schemas-microsoft-com:vml" Requires="v">
-                <p:oleObj spid="_x0000_s1156" name="Equation" r:id="rId4" imgW="609600" imgH="457200" progId="Equation.3">
+                <p:oleObj spid="_x0000_s1161" name="Equation" r:id="rId4" imgW="609600" imgH="457200" progId="Equation.3">
                   <p:embed/>
                 </p:oleObj>
               </mc:Choice>
@@ -6361,7 +6360,7 @@
           <a:graphicData uri="http://schemas.openxmlformats.org/presentationml/2006/ole">
             <mc:AlternateContent xmlns:mc="http://schemas.openxmlformats.org/markup-compatibility/2006">
               <mc:Choice xmlns:v="urn:schemas-microsoft-com:vml" Requires="v">
-                <p:oleObj spid="_x0000_s1157" name="Equation" r:id="rId6" imgW="635000" imgH="457200" progId="Equation.3">
+                <p:oleObj spid="_x0000_s1162" name="Equation" r:id="rId6" imgW="635000" imgH="457200" progId="Equation.3">
                   <p:embed/>
                 </p:oleObj>
               </mc:Choice>
@@ -19909,7 +19908,7 @@
         </p:nvSpPr>
         <p:spPr>
           <a:xfrm>
-            <a:off x="975895" y="1000140"/>
+            <a:off x="975895" y="612456"/>
             <a:ext cx="7178842" cy="1200329"/>
           </a:xfrm>
           <a:prstGeom prst="rect">
@@ -19925,7 +19924,19 @@
           <a:p>
             <a:r>
               <a:rPr lang="en-US" dirty="0" smtClean="0"/>
-              <a:t>All possible permutations of outcomes: 2</a:t>
+              <a:t>Imagine a cell with N </a:t>
+            </a:r>
+            <a:r>
+              <a:rPr lang="en-US" dirty="0" smtClean="0"/>
+              <a:t>susceptible farms (in the following example, N=3). </a:t>
+            </a:r>
+            <a:r>
+              <a:rPr lang="en-US" dirty="0" smtClean="0"/>
+              <a:t>All </a:t>
+            </a:r>
+            <a:r>
+              <a:rPr lang="en-US" dirty="0" smtClean="0"/>
+              <a:t>possible permutations of outcomes: 2</a:t>
             </a:r>
             <a:r>
               <a:rPr lang="en-US" baseline="30000" dirty="0" smtClean="0"/>
@@ -19933,7 +19944,15 @@
             </a:r>
             <a:r>
               <a:rPr lang="en-US" dirty="0" smtClean="0"/>
-              <a:t> total options, where N is the total number of farms. An outcome of 1 means infected, and has probability </a:t>
+              <a:t> total </a:t>
+            </a:r>
+            <a:r>
+              <a:rPr lang="en-US" dirty="0" smtClean="0"/>
+              <a:t>options. </a:t>
+            </a:r>
+            <a:r>
+              <a:rPr lang="en-US" dirty="0" smtClean="0"/>
+              <a:t>An outcome of 1 means infected, and has probability </a:t>
             </a:r>
             <a:r>
               <a:rPr lang="en-US" dirty="0" err="1" smtClean="0"/>
@@ -21321,7 +21340,23 @@
           <a:p>
             <a:r>
               <a:rPr lang="en-US" dirty="0" smtClean="0"/>
-              <a:t>Gridding chooses to realize the first option (0,0,0), or eliminate it (and enter the cell):</a:t>
+              <a:t>Gridding chooses to realize the first option (0,0,0</a:t>
+            </a:r>
+            <a:r>
+              <a:rPr lang="en-US" dirty="0" smtClean="0"/>
+              <a:t>) </a:t>
+            </a:r>
+            <a:r>
+              <a:rPr lang="en-US" dirty="0" smtClean="0"/>
+              <a:t>(skipping a cell)</a:t>
+            </a:r>
+            <a:r>
+              <a:rPr lang="en-US" dirty="0" smtClean="0"/>
+              <a:t>, </a:t>
+            </a:r>
+            <a:r>
+              <a:rPr lang="en-US" dirty="0" smtClean="0"/>
+              <a:t>or eliminate it (and enter the cell):</a:t>
             </a:r>
             <a:endParaRPr lang="en-US" baseline="30000" dirty="0"/>
           </a:p>
@@ -26882,7 +26917,7 @@
         <p:spPr>
           <a:xfrm>
             <a:off x="775368" y="909310"/>
-            <a:ext cx="7927474" cy="1477328"/>
+            <a:ext cx="7927474" cy="1754327"/>
           </a:xfrm>
           <a:prstGeom prst="rect">
             <a:avLst/>
@@ -26897,7 +26932,11 @@
           <a:p>
             <a:r>
               <a:rPr lang="en-US" dirty="0" smtClean="0"/>
-              <a:t>Using the same random number to evaluate </a:t>
+              <a:t>Using the same random number to </a:t>
+            </a:r>
+            <a:r>
+              <a:rPr lang="en-US" dirty="0" smtClean="0"/>
+              <a:t>evaluate the adjusted version of </a:t>
             </a:r>
             <a:r>
               <a:rPr lang="en-US" dirty="0" err="1" smtClean="0"/>
@@ -26908,120 +26947,20 @@
               <a:t>max</a:t>
             </a:r>
             <a:r>
-              <a:rPr lang="en-US" dirty="0" smtClean="0"/>
-              <a:t>, then evaluate actual p using the same expression (either just p or </a:t>
-            </a:r>
-            <a:r>
-              <a:rPr lang="en-US" dirty="0" smtClean="0">
-                <a:solidFill>
-                  <a:srgbClr val="008000"/>
-                </a:solidFill>
-              </a:rPr>
-              <a:t>2</a:t>
-            </a:r>
-            <a:r>
-              <a:rPr lang="en-US" baseline="30000" dirty="0" smtClean="0">
-                <a:solidFill>
-                  <a:srgbClr val="008000"/>
-                </a:solidFill>
-              </a:rPr>
-              <a:t>N</a:t>
-            </a:r>
-            <a:r>
-              <a:rPr lang="en-US" baseline="30000" dirty="0">
-                <a:solidFill>
-                  <a:srgbClr val="008000"/>
-                </a:solidFill>
-              </a:rPr>
-              <a:t>-</a:t>
-            </a:r>
-            <a:r>
-              <a:rPr lang="en-US" baseline="30000" dirty="0" smtClean="0">
-                <a:solidFill>
-                  <a:srgbClr val="008000"/>
-                </a:solidFill>
-              </a:rPr>
-              <a:t>f</a:t>
-            </a:r>
-            <a:r>
               <a:rPr lang="en-US" dirty="0"/>
-              <a:t>*</a:t>
-            </a:r>
-            <a:r>
-              <a:rPr lang="en-US" dirty="0" smtClean="0"/>
-              <a:t>p/ </a:t>
-            </a:r>
-            <a:r>
-              <a:rPr lang="en-US" dirty="0"/>
-              <a:t>(</a:t>
-            </a:r>
-            <a:r>
-              <a:rPr lang="en-US" dirty="0" smtClean="0">
-                <a:solidFill>
-                  <a:srgbClr val="008000"/>
-                </a:solidFill>
-              </a:rPr>
-              <a:t>2</a:t>
-            </a:r>
-            <a:r>
-              <a:rPr lang="en-US" baseline="30000" dirty="0" smtClean="0">
-                <a:solidFill>
-                  <a:srgbClr val="008000"/>
-                </a:solidFill>
-              </a:rPr>
-              <a:t>N-f</a:t>
-            </a:r>
-            <a:r>
-              <a:rPr lang="en-US" dirty="0"/>
-              <a:t>*</a:t>
-            </a:r>
-            <a:r>
-              <a:rPr lang="en-US" dirty="0" smtClean="0"/>
-              <a:t>p </a:t>
-            </a:r>
-            <a:r>
-              <a:rPr lang="en-US" dirty="0"/>
-              <a:t>+ </a:t>
-            </a:r>
-            <a:r>
-              <a:rPr lang="en-US" dirty="0">
-                <a:solidFill>
-                  <a:srgbClr val="0000FF"/>
-                </a:solidFill>
-              </a:rPr>
-              <a:t>(</a:t>
-            </a:r>
-            <a:r>
-              <a:rPr lang="en-US" dirty="0" smtClean="0">
-                <a:solidFill>
-                  <a:srgbClr val="0000FF"/>
-                </a:solidFill>
-              </a:rPr>
-              <a:t>2</a:t>
-            </a:r>
-            <a:r>
-              <a:rPr lang="en-US" baseline="30000" dirty="0" smtClean="0">
-                <a:solidFill>
-                  <a:srgbClr val="0000FF"/>
-                </a:solidFill>
-              </a:rPr>
-              <a:t>N-f </a:t>
-            </a:r>
-            <a:r>
-              <a:rPr lang="en-US" dirty="0">
-                <a:solidFill>
-                  <a:srgbClr val="0000FF"/>
-                </a:solidFill>
-              </a:rPr>
-              <a:t>– 1)</a:t>
-            </a:r>
-            <a:r>
-              <a:rPr lang="en-US" dirty="0"/>
-              <a:t>*(1-</a:t>
-            </a:r>
-            <a:r>
-              <a:rPr lang="en-US" dirty="0" smtClean="0"/>
-              <a:t>p))). The relationship between </a:t>
+              <a:t> </a:t>
+            </a:r>
+            <a:r>
+              <a:rPr lang="en-US" dirty="0" smtClean="0"/>
+              <a:t>– the probability the hypothetical farm is infected given a particular permutation of infections. </a:t>
+            </a:r>
+            <a:r>
+              <a:rPr lang="en-US" dirty="0" smtClean="0"/>
+              <a:t>Using the same random number, evaluate actual p. The </a:t>
+            </a:r>
+            <a:r>
+              <a:rPr lang="en-US" dirty="0" smtClean="0"/>
+              <a:t>relationship between </a:t>
             </a:r>
             <a:r>
               <a:rPr lang="en-US" dirty="0" err="1" smtClean="0"/>
@@ -27033,7 +26972,23 @@
             </a:r>
             <a:r>
               <a:rPr lang="en-US" dirty="0" smtClean="0"/>
-              <a:t> and p if you use the same random number to compare them, is that </a:t>
+              <a:t> and p </a:t>
+            </a:r>
+            <a:r>
+              <a:rPr lang="en-US" dirty="0" smtClean="0"/>
+              <a:t>(if </a:t>
+            </a:r>
+            <a:r>
+              <a:rPr lang="en-US" dirty="0" smtClean="0"/>
+              <a:t>you use the same random number to compare </a:t>
+            </a:r>
+            <a:r>
+              <a:rPr lang="en-US" dirty="0" smtClean="0"/>
+              <a:t>them), </a:t>
+            </a:r>
+            <a:r>
+              <a:rPr lang="en-US" dirty="0" smtClean="0"/>
+              <a:t>is that </a:t>
             </a:r>
             <a:r>
               <a:rPr lang="en-US" dirty="0" err="1" smtClean="0"/>
@@ -27058,195 +27013,6 @@
     <p:extLst>
       <p:ext uri="{BB962C8B-B14F-4D97-AF65-F5344CB8AC3E}">
         <p14:creationId xmlns:p14="http://schemas.microsoft.com/office/powerpoint/2010/main" val="1931304942"/>
-      </p:ext>
-    </p:extLst>
-  </p:cSld>
-  <p:clrMapOvr>
-    <a:masterClrMapping/>
-  </p:clrMapOvr>
-</p:sld>
-</file>
-
-<file path=ppt/slides/slide36.xml><?xml version="1.0" encoding="utf-8"?>
-<p:sld xmlns:a="http://schemas.openxmlformats.org/drawingml/2006/main" xmlns:r="http://schemas.openxmlformats.org/officeDocument/2006/relationships" xmlns:p="http://schemas.openxmlformats.org/presentationml/2006/main">
-  <p:cSld>
-    <p:spTree>
-      <p:nvGrpSpPr>
-        <p:cNvPr id="1" name=""/>
-        <p:cNvGrpSpPr/>
-        <p:nvPr/>
-      </p:nvGrpSpPr>
-      <p:grpSpPr>
-        <a:xfrm>
-          <a:off x="0" y="0"/>
-          <a:ext cx="0" cy="0"/>
-          <a:chOff x="0" y="0"/>
-          <a:chExt cx="0" cy="0"/>
-        </a:xfrm>
-      </p:grpSpPr>
-      <p:sp>
-        <p:nvSpPr>
-          <p:cNvPr id="2" name="TextBox 1"/>
-          <p:cNvSpPr txBox="1"/>
-          <p:nvPr/>
-        </p:nvSpPr>
-        <p:spPr>
-          <a:xfrm>
-            <a:off x="1470526" y="1336842"/>
-            <a:ext cx="5427579" cy="3693319"/>
-          </a:xfrm>
-          <a:prstGeom prst="rect">
-            <a:avLst/>
-          </a:prstGeom>
-          <a:noFill/>
-        </p:spPr>
-        <p:txBody>
-          <a:bodyPr wrap="square" rtlCol="0">
-            <a:spAutoFit/>
-          </a:bodyPr>
-          <a:lstStyle/>
-          <a:p>
-            <a:r>
-              <a:rPr lang="en-US" dirty="0" smtClean="0"/>
-              <a:t>Changes to code:</a:t>
-            </a:r>
-          </a:p>
-          <a:p>
-            <a:r>
-              <a:rPr lang="en-US" dirty="0" smtClean="0"/>
-              <a:t>Add a lookup table for 2</a:t>
-            </a:r>
-            <a:r>
-              <a:rPr lang="en-US" baseline="30000" dirty="0" smtClean="0"/>
-              <a:t>N</a:t>
-            </a:r>
-            <a:r>
-              <a:rPr lang="en-US" dirty="0" smtClean="0"/>
-              <a:t>, up to the max number of farms detected during grid formation.</a:t>
-            </a:r>
-          </a:p>
-          <a:p>
-            <a:endParaRPr lang="en-US" dirty="0"/>
-          </a:p>
-          <a:p>
-            <a:r>
-              <a:rPr lang="en-US" dirty="0" smtClean="0"/>
-              <a:t>Instead of a simple s= 0 or 1 switch, the options are now</a:t>
-            </a:r>
-          </a:p>
-          <a:p>
-            <a:pPr marL="285750" indent="-285750">
-              <a:buFontTx/>
-              <a:buChar char="-"/>
-            </a:pPr>
-            <a:r>
-              <a:rPr lang="en-US" dirty="0" smtClean="0"/>
-              <a:t>use p as is</a:t>
-            </a:r>
-          </a:p>
-          <a:p>
-            <a:pPr marL="285750" indent="-285750">
-              <a:buFontTx/>
-              <a:buChar char="-"/>
-            </a:pPr>
-            <a:r>
-              <a:rPr lang="en-US" dirty="0" smtClean="0"/>
-              <a:t>Use 2</a:t>
-            </a:r>
-            <a:r>
-              <a:rPr lang="en-US" baseline="30000" dirty="0" smtClean="0"/>
-              <a:t>N-f</a:t>
-            </a:r>
-            <a:r>
-              <a:rPr lang="en-US" dirty="0" smtClean="0"/>
-              <a:t>*p/(2</a:t>
-            </a:r>
-            <a:r>
-              <a:rPr lang="en-US" baseline="30000" dirty="0" smtClean="0"/>
-              <a:t>N</a:t>
-            </a:r>
-            <a:r>
-              <a:rPr lang="en-US" baseline="30000" dirty="0"/>
-              <a:t>-f</a:t>
-            </a:r>
-            <a:r>
-              <a:rPr lang="en-US" dirty="0"/>
-              <a:t>*</a:t>
-            </a:r>
-            <a:r>
-              <a:rPr lang="en-US" dirty="0" smtClean="0"/>
-              <a:t>p + (2</a:t>
-            </a:r>
-            <a:r>
-              <a:rPr lang="en-US" baseline="30000" dirty="0" smtClean="0"/>
-              <a:t>N</a:t>
-            </a:r>
-            <a:r>
-              <a:rPr lang="en-US" baseline="30000" dirty="0"/>
-              <a:t>-</a:t>
-            </a:r>
-            <a:r>
-              <a:rPr lang="en-US" baseline="30000" dirty="0" smtClean="0"/>
-              <a:t>f</a:t>
-            </a:r>
-            <a:r>
-              <a:rPr lang="en-US" dirty="0" smtClean="0"/>
-              <a:t>-1)*(1-p))</a:t>
-            </a:r>
-          </a:p>
-          <a:p>
-            <a:pPr marL="285750" indent="-285750">
-              <a:buFontTx/>
-              <a:buChar char="-"/>
-            </a:pPr>
-            <a:endParaRPr lang="en-US" dirty="0"/>
-          </a:p>
-          <a:p>
-            <a:r>
-              <a:rPr lang="en-US" dirty="0" smtClean="0"/>
-              <a:t>Determined by a “</a:t>
-            </a:r>
-            <a:r>
-              <a:rPr lang="en-US" dirty="0" err="1" smtClean="0"/>
-              <a:t>AllZeros</a:t>
-            </a:r>
-            <a:r>
-              <a:rPr lang="en-US" dirty="0" smtClean="0"/>
-              <a:t>” </a:t>
-            </a:r>
-            <a:r>
-              <a:rPr lang="en-US" dirty="0" err="1" smtClean="0"/>
-              <a:t>boolean</a:t>
-            </a:r>
-            <a:r>
-              <a:rPr lang="en-US" dirty="0" smtClean="0"/>
-              <a:t>: if false use former, if true use latter. Default true until a hypothetical farm is infected.</a:t>
-            </a:r>
-          </a:p>
-          <a:p>
-            <a:endParaRPr lang="en-US" dirty="0" smtClean="0"/>
-          </a:p>
-          <a:p>
-            <a:r>
-              <a:rPr lang="en-US" dirty="0" smtClean="0"/>
-              <a:t>Initiate </a:t>
-            </a:r>
-            <a:r>
-              <a:rPr lang="en-US" dirty="0" err="1" smtClean="0"/>
-              <a:t>fcount</a:t>
-            </a:r>
-            <a:r>
-              <a:rPr lang="en-US" dirty="0" smtClean="0"/>
-              <a:t> as 1 as soon as cell is entered</a:t>
-            </a:r>
-            <a:endParaRPr lang="en-US" dirty="0"/>
-          </a:p>
-        </p:txBody>
-      </p:sp>
-    </p:spTree>
-    <p:extLst>
-      <p:ext uri="{BB962C8B-B14F-4D97-AF65-F5344CB8AC3E}">
-        <p14:creationId xmlns:p14="http://schemas.microsoft.com/office/powerpoint/2010/main" val="1633522541"/>
       </p:ext>
     </p:extLst>
   </p:cSld>
@@ -31887,15 +31653,7 @@
           <a:p>
             <a:r>
               <a:rPr lang="en-US" dirty="0" smtClean="0"/>
-              <a:t>Step 1: </a:t>
-            </a:r>
-            <a:r>
-              <a:rPr lang="en-US" dirty="0" smtClean="0"/>
-              <a:t>Cell </a:t>
-            </a:r>
-            <a:r>
-              <a:rPr lang="en-US" dirty="0" smtClean="0"/>
-              <a:t>entry</a:t>
+              <a:t>Step 1: Cell entry</a:t>
             </a:r>
             <a:endParaRPr lang="en-US" dirty="0"/>
           </a:p>

</xml_diff>